<commit_message>
finished draft of paper, with gnuplot graphs
</commit_message>
<xml_diff>
--- a/Paper/Figures/distributions.pptx
+++ b/Paper/Figures/distributions.pptx
@@ -290,7 +290,7 @@
           <a:p>
             <a:fld id="{04C89055-7E7D-2F4D-A01D-66994F4CCDEC}" type="datetimeFigureOut">
               <a:rPr lang="en-US" smtClean="0"/>
-              <a:t>4/24/14</a:t>
+              <a:t>5/20/14</a:t>
             </a:fld>
             <a:endParaRPr lang="en-US"/>
           </a:p>
@@ -460,7 +460,7 @@
           <a:p>
             <a:fld id="{04C89055-7E7D-2F4D-A01D-66994F4CCDEC}" type="datetimeFigureOut">
               <a:rPr lang="en-US" smtClean="0"/>
-              <a:t>4/24/14</a:t>
+              <a:t>5/20/14</a:t>
             </a:fld>
             <a:endParaRPr lang="en-US"/>
           </a:p>
@@ -640,7 +640,7 @@
           <a:p>
             <a:fld id="{04C89055-7E7D-2F4D-A01D-66994F4CCDEC}" type="datetimeFigureOut">
               <a:rPr lang="en-US" smtClean="0"/>
-              <a:t>4/24/14</a:t>
+              <a:t>5/20/14</a:t>
             </a:fld>
             <a:endParaRPr lang="en-US"/>
           </a:p>
@@ -810,7 +810,7 @@
           <a:p>
             <a:fld id="{04C89055-7E7D-2F4D-A01D-66994F4CCDEC}" type="datetimeFigureOut">
               <a:rPr lang="en-US" smtClean="0"/>
-              <a:t>4/24/14</a:t>
+              <a:t>5/20/14</a:t>
             </a:fld>
             <a:endParaRPr lang="en-US"/>
           </a:p>
@@ -1056,7 +1056,7 @@
           <a:p>
             <a:fld id="{04C89055-7E7D-2F4D-A01D-66994F4CCDEC}" type="datetimeFigureOut">
               <a:rPr lang="en-US" smtClean="0"/>
-              <a:t>4/24/14</a:t>
+              <a:t>5/20/14</a:t>
             </a:fld>
             <a:endParaRPr lang="en-US"/>
           </a:p>
@@ -1344,7 +1344,7 @@
           <a:p>
             <a:fld id="{04C89055-7E7D-2F4D-A01D-66994F4CCDEC}" type="datetimeFigureOut">
               <a:rPr lang="en-US" smtClean="0"/>
-              <a:t>4/24/14</a:t>
+              <a:t>5/20/14</a:t>
             </a:fld>
             <a:endParaRPr lang="en-US"/>
           </a:p>
@@ -1766,7 +1766,7 @@
           <a:p>
             <a:fld id="{04C89055-7E7D-2F4D-A01D-66994F4CCDEC}" type="datetimeFigureOut">
               <a:rPr lang="en-US" smtClean="0"/>
-              <a:t>4/24/14</a:t>
+              <a:t>5/20/14</a:t>
             </a:fld>
             <a:endParaRPr lang="en-US"/>
           </a:p>
@@ -1884,7 +1884,7 @@
           <a:p>
             <a:fld id="{04C89055-7E7D-2F4D-A01D-66994F4CCDEC}" type="datetimeFigureOut">
               <a:rPr lang="en-US" smtClean="0"/>
-              <a:t>4/24/14</a:t>
+              <a:t>5/20/14</a:t>
             </a:fld>
             <a:endParaRPr lang="en-US"/>
           </a:p>
@@ -1979,7 +1979,7 @@
           <a:p>
             <a:fld id="{04C89055-7E7D-2F4D-A01D-66994F4CCDEC}" type="datetimeFigureOut">
               <a:rPr lang="en-US" smtClean="0"/>
-              <a:t>4/24/14</a:t>
+              <a:t>5/20/14</a:t>
             </a:fld>
             <a:endParaRPr lang="en-US"/>
           </a:p>
@@ -2256,7 +2256,7 @@
           <a:p>
             <a:fld id="{04C89055-7E7D-2F4D-A01D-66994F4CCDEC}" type="datetimeFigureOut">
               <a:rPr lang="en-US" smtClean="0"/>
-              <a:t>4/24/14</a:t>
+              <a:t>5/20/14</a:t>
             </a:fld>
             <a:endParaRPr lang="en-US"/>
           </a:p>
@@ -2509,7 +2509,7 @@
           <a:p>
             <a:fld id="{04C89055-7E7D-2F4D-A01D-66994F4CCDEC}" type="datetimeFigureOut">
               <a:rPr lang="en-US" smtClean="0"/>
-              <a:t>4/24/14</a:t>
+              <a:t>5/20/14</a:t>
             </a:fld>
             <a:endParaRPr lang="en-US"/>
           </a:p>
@@ -2722,7 +2722,7 @@
           <a:p>
             <a:fld id="{04C89055-7E7D-2F4D-A01D-66994F4CCDEC}" type="datetimeFigureOut">
               <a:rPr lang="en-US" smtClean="0"/>
-              <a:t>4/24/14</a:t>
+              <a:t>5/20/14</a:t>
             </a:fld>
             <a:endParaRPr lang="en-US"/>
           </a:p>
@@ -6359,7 +6359,7 @@
         </p:nvGrpSpPr>
         <p:grpSpPr>
           <a:xfrm>
-            <a:off x="5188885" y="1838144"/>
+            <a:off x="4687189" y="1838144"/>
             <a:ext cx="988507" cy="1969435"/>
             <a:chOff x="4872761" y="2575364"/>
             <a:chExt cx="988507" cy="1969435"/>
@@ -6495,13 +6495,13 @@
           <p:nvPr>
             <p:extLst>
               <p:ext uri="{D42A27DB-BD31-4B8C-83A1-F6EECF244321}">
-                <p14:modId xmlns:p14="http://schemas.microsoft.com/office/powerpoint/2010/main" val="4289961391"/>
+                <p14:modId xmlns:p14="http://schemas.microsoft.com/office/powerpoint/2010/main" val="1382734783"/>
               </p:ext>
             </p:extLst>
           </p:nvPr>
         </p:nvGraphicFramePr>
         <p:xfrm>
-          <a:off x="6132632" y="1838940"/>
+          <a:off x="5630936" y="1838940"/>
           <a:ext cx="362441" cy="365760"/>
         </p:xfrm>
         <a:graphic>
@@ -6578,13 +6578,13 @@
           <p:nvPr>
             <p:extLst>
               <p:ext uri="{D42A27DB-BD31-4B8C-83A1-F6EECF244321}">
-                <p14:modId xmlns:p14="http://schemas.microsoft.com/office/powerpoint/2010/main" val="2302948853"/>
+                <p14:modId xmlns:p14="http://schemas.microsoft.com/office/powerpoint/2010/main" val="3521023931"/>
               </p:ext>
             </p:extLst>
           </p:nvPr>
         </p:nvGraphicFramePr>
         <p:xfrm>
-          <a:off x="6138827" y="2378655"/>
+          <a:off x="5637131" y="2378655"/>
           <a:ext cx="362441" cy="365760"/>
         </p:xfrm>
         <a:graphic>
@@ -6661,13 +6661,13 @@
           <p:nvPr>
             <p:extLst>
               <p:ext uri="{D42A27DB-BD31-4B8C-83A1-F6EECF244321}">
-                <p14:modId xmlns:p14="http://schemas.microsoft.com/office/powerpoint/2010/main" val="3759359767"/>
+                <p14:modId xmlns:p14="http://schemas.microsoft.com/office/powerpoint/2010/main" val="2258903091"/>
               </p:ext>
             </p:extLst>
           </p:nvPr>
         </p:nvGraphicFramePr>
         <p:xfrm>
-          <a:off x="6132632" y="2937777"/>
+          <a:off x="5630936" y="2937777"/>
           <a:ext cx="362441" cy="365760"/>
         </p:xfrm>
         <a:graphic>
@@ -6744,13 +6744,13 @@
           <p:nvPr>
             <p:extLst>
               <p:ext uri="{D42A27DB-BD31-4B8C-83A1-F6EECF244321}">
-                <p14:modId xmlns:p14="http://schemas.microsoft.com/office/powerpoint/2010/main" val="2207197915"/>
+                <p14:modId xmlns:p14="http://schemas.microsoft.com/office/powerpoint/2010/main" val="1288160890"/>
               </p:ext>
             </p:extLst>
           </p:nvPr>
         </p:nvGraphicFramePr>
         <p:xfrm>
-          <a:off x="6131075" y="3463110"/>
+          <a:off x="5629379" y="3463110"/>
           <a:ext cx="362441" cy="365760"/>
         </p:xfrm>
         <a:graphic>
@@ -6818,6 +6818,669 @@
           </a:graphicData>
         </a:graphic>
       </p:graphicFrame>
+      <p:grpSp>
+        <p:nvGrpSpPr>
+          <p:cNvPr id="3" name="Group 2"/>
+          <p:cNvGrpSpPr/>
+          <p:nvPr/>
+        </p:nvGrpSpPr>
+        <p:grpSpPr>
+          <a:xfrm>
+            <a:off x="909413" y="767577"/>
+            <a:ext cx="3680967" cy="379998"/>
+            <a:chOff x="909413" y="767577"/>
+            <a:chExt cx="3680967" cy="379998"/>
+          </a:xfrm>
+        </p:grpSpPr>
+        <p:sp>
+          <p:nvSpPr>
+            <p:cNvPr id="2" name="TextBox 1"/>
+            <p:cNvSpPr txBox="1"/>
+            <p:nvPr/>
+          </p:nvSpPr>
+          <p:spPr>
+            <a:xfrm>
+              <a:off x="909413" y="768735"/>
+              <a:ext cx="381876" cy="369332"/>
+            </a:xfrm>
+            <a:prstGeom prst="rect">
+              <a:avLst/>
+            </a:prstGeom>
+            <a:noFill/>
+          </p:spPr>
+          <p:txBody>
+            <a:bodyPr wrap="square" rtlCol="0">
+              <a:spAutoFit/>
+            </a:bodyPr>
+            <a:lstStyle/>
+            <a:p>
+              <a:r>
+                <a:rPr lang="en-US" dirty="0" smtClean="0"/>
+                <a:t>1</a:t>
+              </a:r>
+              <a:endParaRPr lang="en-US" dirty="0"/>
+            </a:p>
+          </p:txBody>
+        </p:sp>
+        <p:sp>
+          <p:nvSpPr>
+            <p:cNvPr id="15" name="TextBox 14"/>
+            <p:cNvSpPr txBox="1"/>
+            <p:nvPr/>
+          </p:nvSpPr>
+          <p:spPr>
+            <a:xfrm>
+              <a:off x="1379284" y="770727"/>
+              <a:ext cx="381876" cy="369332"/>
+            </a:xfrm>
+            <a:prstGeom prst="rect">
+              <a:avLst/>
+            </a:prstGeom>
+            <a:noFill/>
+          </p:spPr>
+          <p:txBody>
+            <a:bodyPr wrap="square" rtlCol="0">
+              <a:spAutoFit/>
+            </a:bodyPr>
+            <a:lstStyle/>
+            <a:p>
+              <a:r>
+                <a:rPr lang="en-US" dirty="0"/>
+                <a:t>2</a:t>
+              </a:r>
+            </a:p>
+          </p:txBody>
+        </p:sp>
+        <p:sp>
+          <p:nvSpPr>
+            <p:cNvPr id="17" name="TextBox 16"/>
+            <p:cNvSpPr txBox="1"/>
+            <p:nvPr/>
+          </p:nvSpPr>
+          <p:spPr>
+            <a:xfrm>
+              <a:off x="1856710" y="770727"/>
+              <a:ext cx="381876" cy="369332"/>
+            </a:xfrm>
+            <a:prstGeom prst="rect">
+              <a:avLst/>
+            </a:prstGeom>
+            <a:noFill/>
+          </p:spPr>
+          <p:txBody>
+            <a:bodyPr wrap="square" rtlCol="0">
+              <a:spAutoFit/>
+            </a:bodyPr>
+            <a:lstStyle/>
+            <a:p>
+              <a:r>
+                <a:rPr lang="en-US" dirty="0"/>
+                <a:t>3</a:t>
+              </a:r>
+            </a:p>
+          </p:txBody>
+        </p:sp>
+        <p:sp>
+          <p:nvSpPr>
+            <p:cNvPr id="18" name="TextBox 17"/>
+            <p:cNvSpPr txBox="1"/>
+            <p:nvPr/>
+          </p:nvSpPr>
+          <p:spPr>
+            <a:xfrm>
+              <a:off x="2331459" y="772719"/>
+              <a:ext cx="381876" cy="369332"/>
+            </a:xfrm>
+            <a:prstGeom prst="rect">
+              <a:avLst/>
+            </a:prstGeom>
+            <a:noFill/>
+          </p:spPr>
+          <p:txBody>
+            <a:bodyPr wrap="square" rtlCol="0">
+              <a:spAutoFit/>
+            </a:bodyPr>
+            <a:lstStyle/>
+            <a:p>
+              <a:r>
+                <a:rPr lang="en-US" dirty="0" smtClean="0"/>
+                <a:t>4</a:t>
+              </a:r>
+              <a:endParaRPr lang="en-US" dirty="0"/>
+            </a:p>
+          </p:txBody>
+        </p:sp>
+        <p:sp>
+          <p:nvSpPr>
+            <p:cNvPr id="19" name="TextBox 18"/>
+            <p:cNvSpPr txBox="1"/>
+            <p:nvPr/>
+          </p:nvSpPr>
+          <p:spPr>
+            <a:xfrm>
+              <a:off x="2786878" y="767577"/>
+              <a:ext cx="381876" cy="369332"/>
+            </a:xfrm>
+            <a:prstGeom prst="rect">
+              <a:avLst/>
+            </a:prstGeom>
+            <a:noFill/>
+          </p:spPr>
+          <p:txBody>
+            <a:bodyPr wrap="square" rtlCol="0">
+              <a:spAutoFit/>
+            </a:bodyPr>
+            <a:lstStyle/>
+            <a:p>
+              <a:r>
+                <a:rPr lang="en-US" dirty="0"/>
+                <a:t>5</a:t>
+              </a:r>
+            </a:p>
+          </p:txBody>
+        </p:sp>
+        <p:sp>
+          <p:nvSpPr>
+            <p:cNvPr id="20" name="TextBox 19"/>
+            <p:cNvSpPr txBox="1"/>
+            <p:nvPr/>
+          </p:nvSpPr>
+          <p:spPr>
+            <a:xfrm>
+              <a:off x="3252053" y="776703"/>
+              <a:ext cx="381876" cy="369332"/>
+            </a:xfrm>
+            <a:prstGeom prst="rect">
+              <a:avLst/>
+            </a:prstGeom>
+            <a:noFill/>
+          </p:spPr>
+          <p:txBody>
+            <a:bodyPr wrap="square" rtlCol="0">
+              <a:spAutoFit/>
+            </a:bodyPr>
+            <a:lstStyle/>
+            <a:p>
+              <a:r>
+                <a:rPr lang="en-US" dirty="0" smtClean="0"/>
+                <a:t>6</a:t>
+              </a:r>
+              <a:endParaRPr lang="en-US" dirty="0"/>
+            </a:p>
+          </p:txBody>
+        </p:sp>
+        <p:sp>
+          <p:nvSpPr>
+            <p:cNvPr id="21" name="TextBox 20"/>
+            <p:cNvSpPr txBox="1"/>
+            <p:nvPr/>
+          </p:nvSpPr>
+          <p:spPr>
+            <a:xfrm>
+              <a:off x="3712350" y="776251"/>
+              <a:ext cx="381876" cy="369332"/>
+            </a:xfrm>
+            <a:prstGeom prst="rect">
+              <a:avLst/>
+            </a:prstGeom>
+            <a:noFill/>
+          </p:spPr>
+          <p:txBody>
+            <a:bodyPr wrap="square" rtlCol="0">
+              <a:spAutoFit/>
+            </a:bodyPr>
+            <a:lstStyle/>
+            <a:p>
+              <a:r>
+                <a:rPr lang="en-US" dirty="0"/>
+                <a:t>7</a:t>
+              </a:r>
+            </a:p>
+          </p:txBody>
+        </p:sp>
+        <p:sp>
+          <p:nvSpPr>
+            <p:cNvPr id="22" name="TextBox 21"/>
+            <p:cNvSpPr txBox="1"/>
+            <p:nvPr/>
+          </p:nvSpPr>
+          <p:spPr>
+            <a:xfrm>
+              <a:off x="4208504" y="778243"/>
+              <a:ext cx="381876" cy="369332"/>
+            </a:xfrm>
+            <a:prstGeom prst="rect">
+              <a:avLst/>
+            </a:prstGeom>
+            <a:noFill/>
+          </p:spPr>
+          <p:txBody>
+            <a:bodyPr wrap="square" rtlCol="0">
+              <a:spAutoFit/>
+            </a:bodyPr>
+            <a:lstStyle/>
+            <a:p>
+              <a:r>
+                <a:rPr lang="en-US" dirty="0" smtClean="0"/>
+                <a:t>8</a:t>
+              </a:r>
+              <a:endParaRPr lang="en-US" dirty="0"/>
+            </a:p>
+          </p:txBody>
+        </p:sp>
+      </p:grpSp>
+      <p:grpSp>
+        <p:nvGrpSpPr>
+          <p:cNvPr id="30" name="Group 29"/>
+          <p:cNvGrpSpPr/>
+          <p:nvPr/>
+        </p:nvGrpSpPr>
+        <p:grpSpPr>
+          <a:xfrm>
+            <a:off x="465728" y="1189569"/>
+            <a:ext cx="316953" cy="2913806"/>
+            <a:chOff x="465728" y="1189569"/>
+            <a:chExt cx="316953" cy="2913806"/>
+          </a:xfrm>
+        </p:grpSpPr>
+        <p:sp>
+          <p:nvSpPr>
+            <p:cNvPr id="9" name="TextBox 8"/>
+            <p:cNvSpPr txBox="1"/>
+            <p:nvPr/>
+          </p:nvSpPr>
+          <p:spPr>
+            <a:xfrm>
+              <a:off x="468216" y="1189569"/>
+              <a:ext cx="301391" cy="369332"/>
+            </a:xfrm>
+            <a:prstGeom prst="rect">
+              <a:avLst/>
+            </a:prstGeom>
+            <a:noFill/>
+          </p:spPr>
+          <p:txBody>
+            <a:bodyPr wrap="square" rtlCol="0">
+              <a:spAutoFit/>
+            </a:bodyPr>
+            <a:lstStyle/>
+            <a:p>
+              <a:r>
+                <a:rPr lang="en-US" dirty="0" smtClean="0"/>
+                <a:t>1</a:t>
+              </a:r>
+              <a:endParaRPr lang="en-US" dirty="0"/>
+            </a:p>
+          </p:txBody>
+        </p:sp>
+        <p:grpSp>
+          <p:nvGrpSpPr>
+            <p:cNvPr id="10" name="Group 9"/>
+            <p:cNvGrpSpPr/>
+            <p:nvPr/>
+          </p:nvGrpSpPr>
+          <p:grpSpPr>
+            <a:xfrm>
+              <a:off x="465728" y="1549616"/>
+              <a:ext cx="316953" cy="2553759"/>
+              <a:chOff x="465728" y="1549616"/>
+              <a:chExt cx="316953" cy="2553759"/>
+            </a:xfrm>
+          </p:grpSpPr>
+          <p:sp>
+            <p:nvSpPr>
+              <p:cNvPr id="23" name="TextBox 22"/>
+              <p:cNvSpPr txBox="1"/>
+              <p:nvPr/>
+            </p:nvSpPr>
+            <p:spPr>
+              <a:xfrm>
+                <a:off x="470917" y="1549616"/>
+                <a:ext cx="301391" cy="369332"/>
+              </a:xfrm>
+              <a:prstGeom prst="rect">
+                <a:avLst/>
+              </a:prstGeom>
+              <a:noFill/>
+            </p:spPr>
+            <p:txBody>
+              <a:bodyPr wrap="square" rtlCol="0">
+                <a:spAutoFit/>
+              </a:bodyPr>
+              <a:lstStyle/>
+              <a:p>
+                <a:r>
+                  <a:rPr lang="en-US" dirty="0"/>
+                  <a:t>2</a:t>
+                </a:r>
+              </a:p>
+            </p:txBody>
+          </p:sp>
+          <p:sp>
+            <p:nvSpPr>
+              <p:cNvPr id="24" name="TextBox 23"/>
+              <p:cNvSpPr txBox="1"/>
+              <p:nvPr/>
+            </p:nvSpPr>
+            <p:spPr>
+              <a:xfrm>
+                <a:off x="473618" y="1890347"/>
+                <a:ext cx="301391" cy="369332"/>
+              </a:xfrm>
+              <a:prstGeom prst="rect">
+                <a:avLst/>
+              </a:prstGeom>
+              <a:noFill/>
+            </p:spPr>
+            <p:txBody>
+              <a:bodyPr wrap="square" rtlCol="0">
+                <a:spAutoFit/>
+              </a:bodyPr>
+              <a:lstStyle/>
+              <a:p>
+                <a:r>
+                  <a:rPr lang="en-US" dirty="0" smtClean="0"/>
+                  <a:t>3</a:t>
+                </a:r>
+                <a:endParaRPr lang="en-US" dirty="0"/>
+              </a:p>
+            </p:txBody>
+          </p:sp>
+          <p:sp>
+            <p:nvSpPr>
+              <p:cNvPr id="25" name="TextBox 24"/>
+              <p:cNvSpPr txBox="1"/>
+              <p:nvPr/>
+            </p:nvSpPr>
+            <p:spPr>
+              <a:xfrm>
+                <a:off x="481148" y="2289026"/>
+                <a:ext cx="301391" cy="369332"/>
+              </a:xfrm>
+              <a:prstGeom prst="rect">
+                <a:avLst/>
+              </a:prstGeom>
+              <a:noFill/>
+            </p:spPr>
+            <p:txBody>
+              <a:bodyPr wrap="square" rtlCol="0">
+                <a:spAutoFit/>
+              </a:bodyPr>
+              <a:lstStyle/>
+              <a:p>
+                <a:r>
+                  <a:rPr lang="en-US" dirty="0"/>
+                  <a:t>4</a:t>
+                </a:r>
+              </a:p>
+            </p:txBody>
+          </p:sp>
+          <p:sp>
+            <p:nvSpPr>
+              <p:cNvPr id="26" name="TextBox 25"/>
+              <p:cNvSpPr txBox="1"/>
+              <p:nvPr/>
+            </p:nvSpPr>
+            <p:spPr>
+              <a:xfrm>
+                <a:off x="473689" y="2649073"/>
+                <a:ext cx="301391" cy="369332"/>
+              </a:xfrm>
+              <a:prstGeom prst="rect">
+                <a:avLst/>
+              </a:prstGeom>
+              <a:noFill/>
+            </p:spPr>
+            <p:txBody>
+              <a:bodyPr wrap="square" rtlCol="0">
+                <a:spAutoFit/>
+              </a:bodyPr>
+              <a:lstStyle/>
+              <a:p>
+                <a:r>
+                  <a:rPr lang="en-US" dirty="0" smtClean="0"/>
+                  <a:t>5</a:t>
+                </a:r>
+                <a:endParaRPr lang="en-US" dirty="0"/>
+              </a:p>
+            </p:txBody>
+          </p:sp>
+          <p:sp>
+            <p:nvSpPr>
+              <p:cNvPr id="27" name="TextBox 26"/>
+              <p:cNvSpPr txBox="1"/>
+              <p:nvPr/>
+            </p:nvSpPr>
+            <p:spPr>
+              <a:xfrm>
+                <a:off x="465728" y="3013949"/>
+                <a:ext cx="301391" cy="369332"/>
+              </a:xfrm>
+              <a:prstGeom prst="rect">
+                <a:avLst/>
+              </a:prstGeom>
+              <a:noFill/>
+            </p:spPr>
+            <p:txBody>
+              <a:bodyPr wrap="square" rtlCol="0">
+                <a:spAutoFit/>
+              </a:bodyPr>
+              <a:lstStyle/>
+              <a:p>
+                <a:r>
+                  <a:rPr lang="en-US" dirty="0"/>
+                  <a:t>6</a:t>
+                </a:r>
+              </a:p>
+            </p:txBody>
+          </p:sp>
+          <p:sp>
+            <p:nvSpPr>
+              <p:cNvPr id="28" name="TextBox 27"/>
+              <p:cNvSpPr txBox="1"/>
+              <p:nvPr/>
+            </p:nvSpPr>
+            <p:spPr>
+              <a:xfrm>
+                <a:off x="473760" y="3393312"/>
+                <a:ext cx="301391" cy="369332"/>
+              </a:xfrm>
+              <a:prstGeom prst="rect">
+                <a:avLst/>
+              </a:prstGeom>
+              <a:noFill/>
+            </p:spPr>
+            <p:txBody>
+              <a:bodyPr wrap="square" rtlCol="0">
+                <a:spAutoFit/>
+              </a:bodyPr>
+              <a:lstStyle/>
+              <a:p>
+                <a:r>
+                  <a:rPr lang="en-US" dirty="0" smtClean="0"/>
+                  <a:t>7</a:t>
+                </a:r>
+                <a:endParaRPr lang="en-US" dirty="0"/>
+              </a:p>
+            </p:txBody>
+          </p:sp>
+          <p:sp>
+            <p:nvSpPr>
+              <p:cNvPr id="29" name="TextBox 28"/>
+              <p:cNvSpPr txBox="1"/>
+              <p:nvPr/>
+            </p:nvSpPr>
+            <p:spPr>
+              <a:xfrm>
+                <a:off x="481290" y="3734043"/>
+                <a:ext cx="301391" cy="369332"/>
+              </a:xfrm>
+              <a:prstGeom prst="rect">
+                <a:avLst/>
+              </a:prstGeom>
+              <a:noFill/>
+            </p:spPr>
+            <p:txBody>
+              <a:bodyPr wrap="square" rtlCol="0">
+                <a:spAutoFit/>
+              </a:bodyPr>
+              <a:lstStyle/>
+              <a:p>
+                <a:r>
+                  <a:rPr lang="en-US" dirty="0"/>
+                  <a:t>8</a:t>
+                </a:r>
+              </a:p>
+            </p:txBody>
+          </p:sp>
+        </p:grpSp>
+      </p:grpSp>
+      <p:grpSp>
+        <p:nvGrpSpPr>
+          <p:cNvPr id="39" name="Group 38"/>
+          <p:cNvGrpSpPr/>
+          <p:nvPr/>
+        </p:nvGrpSpPr>
+        <p:grpSpPr>
+          <a:xfrm>
+            <a:off x="349066" y="184666"/>
+            <a:ext cx="1006807" cy="1036931"/>
+            <a:chOff x="349066" y="184666"/>
+            <a:chExt cx="1006807" cy="1036931"/>
+          </a:xfrm>
+        </p:grpSpPr>
+        <p:cxnSp>
+          <p:nvCxnSpPr>
+            <p:cNvPr id="32" name="Straight Arrow Connector 31"/>
+            <p:cNvCxnSpPr/>
+            <p:nvPr/>
+          </p:nvCxnSpPr>
+          <p:spPr>
+            <a:xfrm>
+              <a:off x="782539" y="581141"/>
+              <a:ext cx="474749" cy="0"/>
+            </a:xfrm>
+            <a:prstGeom prst="straightConnector1">
+              <a:avLst/>
+            </a:prstGeom>
+            <a:ln>
+              <a:solidFill>
+                <a:schemeClr val="tx1"/>
+              </a:solidFill>
+              <a:tailEnd type="arrow"/>
+            </a:ln>
+          </p:spPr>
+          <p:style>
+            <a:lnRef idx="2">
+              <a:schemeClr val="accent1"/>
+            </a:lnRef>
+            <a:fillRef idx="0">
+              <a:schemeClr val="accent1"/>
+            </a:fillRef>
+            <a:effectRef idx="1">
+              <a:schemeClr val="accent1"/>
+            </a:effectRef>
+            <a:fontRef idx="minor">
+              <a:schemeClr val="tx1"/>
+            </a:fontRef>
+          </p:style>
+        </p:cxnSp>
+        <p:cxnSp>
+          <p:nvCxnSpPr>
+            <p:cNvPr id="35" name="Straight Arrow Connector 34"/>
+            <p:cNvCxnSpPr/>
+            <p:nvPr/>
+          </p:nvCxnSpPr>
+          <p:spPr>
+            <a:xfrm>
+              <a:off x="349066" y="778243"/>
+              <a:ext cx="0" cy="443354"/>
+            </a:xfrm>
+            <a:prstGeom prst="straightConnector1">
+              <a:avLst/>
+            </a:prstGeom>
+            <a:ln>
+              <a:solidFill>
+                <a:schemeClr val="tx1"/>
+              </a:solidFill>
+              <a:tailEnd type="arrow"/>
+            </a:ln>
+          </p:spPr>
+          <p:style>
+            <a:lnRef idx="2">
+              <a:schemeClr val="accent1"/>
+            </a:lnRef>
+            <a:fillRef idx="0">
+              <a:schemeClr val="accent1"/>
+            </a:fillRef>
+            <a:effectRef idx="1">
+              <a:schemeClr val="accent1"/>
+            </a:effectRef>
+            <a:fontRef idx="minor">
+              <a:schemeClr val="tx1"/>
+            </a:fontRef>
+          </p:style>
+        </p:cxnSp>
+        <p:sp>
+          <p:nvSpPr>
+            <p:cNvPr id="37" name="TextBox 36"/>
+            <p:cNvSpPr txBox="1"/>
+            <p:nvPr/>
+          </p:nvSpPr>
+          <p:spPr>
+            <a:xfrm>
+              <a:off x="865704" y="184666"/>
+              <a:ext cx="490169" cy="369332"/>
+            </a:xfrm>
+            <a:prstGeom prst="rect">
+              <a:avLst/>
+            </a:prstGeom>
+            <a:noFill/>
+          </p:spPr>
+          <p:txBody>
+            <a:bodyPr wrap="square" rtlCol="0">
+              <a:spAutoFit/>
+            </a:bodyPr>
+            <a:lstStyle/>
+            <a:p>
+              <a:r>
+                <a:rPr lang="en-US" dirty="0" err="1" smtClean="0"/>
+                <a:t>i</a:t>
+              </a:r>
+              <a:endParaRPr lang="en-US" dirty="0"/>
+            </a:p>
+          </p:txBody>
+        </p:sp>
+        <p:sp>
+          <p:nvSpPr>
+            <p:cNvPr id="38" name="TextBox 37"/>
+            <p:cNvSpPr txBox="1"/>
+            <p:nvPr/>
+          </p:nvSpPr>
+          <p:spPr>
+            <a:xfrm>
+              <a:off x="393792" y="724498"/>
+              <a:ext cx="490169" cy="369332"/>
+            </a:xfrm>
+            <a:prstGeom prst="rect">
+              <a:avLst/>
+            </a:prstGeom>
+            <a:noFill/>
+          </p:spPr>
+          <p:txBody>
+            <a:bodyPr wrap="square" rtlCol="0">
+              <a:spAutoFit/>
+            </a:bodyPr>
+            <a:lstStyle/>
+            <a:p>
+              <a:r>
+                <a:rPr lang="en-US" dirty="0"/>
+                <a:t>j</a:t>
+              </a:r>
+            </a:p>
+          </p:txBody>
+        </p:sp>
+      </p:grpSp>
     </p:spTree>
     <p:extLst>
       <p:ext uri="{BB962C8B-B14F-4D97-AF65-F5344CB8AC3E}">
@@ -6828,6 +7491,13 @@
   <p:clrMapOvr>
     <a:masterClrMapping/>
   </p:clrMapOvr>
+  <p:timing>
+    <p:tnLst>
+      <p:par>
+        <p:cTn xmlns:p14="http://schemas.microsoft.com/office/powerpoint/2010/main" id="1" dur="indefinite" restart="never" nodeType="tmRoot"/>
+      </p:par>
+    </p:tnLst>
+  </p:timing>
 </p:sld>
 </file>
 
@@ -10104,13 +10774,676 @@
       </p:graphicFrame>
       <p:grpSp>
         <p:nvGrpSpPr>
-          <p:cNvPr id="16" name="Group 15"/>
+          <p:cNvPr id="15" name="Group 14"/>
           <p:cNvGrpSpPr/>
           <p:nvPr/>
         </p:nvGrpSpPr>
         <p:grpSpPr>
           <a:xfrm>
-            <a:off x="5188885" y="1838144"/>
+            <a:off x="909413" y="767577"/>
+            <a:ext cx="3680967" cy="379998"/>
+            <a:chOff x="909413" y="767577"/>
+            <a:chExt cx="3680967" cy="379998"/>
+          </a:xfrm>
+        </p:grpSpPr>
+        <p:sp>
+          <p:nvSpPr>
+            <p:cNvPr id="17" name="TextBox 16"/>
+            <p:cNvSpPr txBox="1"/>
+            <p:nvPr/>
+          </p:nvSpPr>
+          <p:spPr>
+            <a:xfrm>
+              <a:off x="909413" y="768735"/>
+              <a:ext cx="381876" cy="369332"/>
+            </a:xfrm>
+            <a:prstGeom prst="rect">
+              <a:avLst/>
+            </a:prstGeom>
+            <a:noFill/>
+          </p:spPr>
+          <p:txBody>
+            <a:bodyPr wrap="square" rtlCol="0">
+              <a:spAutoFit/>
+            </a:bodyPr>
+            <a:lstStyle/>
+            <a:p>
+              <a:r>
+                <a:rPr lang="en-US" dirty="0" smtClean="0"/>
+                <a:t>1</a:t>
+              </a:r>
+              <a:endParaRPr lang="en-US" dirty="0"/>
+            </a:p>
+          </p:txBody>
+        </p:sp>
+        <p:sp>
+          <p:nvSpPr>
+            <p:cNvPr id="18" name="TextBox 17"/>
+            <p:cNvSpPr txBox="1"/>
+            <p:nvPr/>
+          </p:nvSpPr>
+          <p:spPr>
+            <a:xfrm>
+              <a:off x="1379284" y="770727"/>
+              <a:ext cx="381876" cy="369332"/>
+            </a:xfrm>
+            <a:prstGeom prst="rect">
+              <a:avLst/>
+            </a:prstGeom>
+            <a:noFill/>
+          </p:spPr>
+          <p:txBody>
+            <a:bodyPr wrap="square" rtlCol="0">
+              <a:spAutoFit/>
+            </a:bodyPr>
+            <a:lstStyle/>
+            <a:p>
+              <a:r>
+                <a:rPr lang="en-US" dirty="0"/>
+                <a:t>2</a:t>
+              </a:r>
+            </a:p>
+          </p:txBody>
+        </p:sp>
+        <p:sp>
+          <p:nvSpPr>
+            <p:cNvPr id="19" name="TextBox 18"/>
+            <p:cNvSpPr txBox="1"/>
+            <p:nvPr/>
+          </p:nvSpPr>
+          <p:spPr>
+            <a:xfrm>
+              <a:off x="1856710" y="770727"/>
+              <a:ext cx="381876" cy="369332"/>
+            </a:xfrm>
+            <a:prstGeom prst="rect">
+              <a:avLst/>
+            </a:prstGeom>
+            <a:noFill/>
+          </p:spPr>
+          <p:txBody>
+            <a:bodyPr wrap="square" rtlCol="0">
+              <a:spAutoFit/>
+            </a:bodyPr>
+            <a:lstStyle/>
+            <a:p>
+              <a:r>
+                <a:rPr lang="en-US" dirty="0"/>
+                <a:t>3</a:t>
+              </a:r>
+            </a:p>
+          </p:txBody>
+        </p:sp>
+        <p:sp>
+          <p:nvSpPr>
+            <p:cNvPr id="20" name="TextBox 19"/>
+            <p:cNvSpPr txBox="1"/>
+            <p:nvPr/>
+          </p:nvSpPr>
+          <p:spPr>
+            <a:xfrm>
+              <a:off x="2331459" y="772719"/>
+              <a:ext cx="381876" cy="369332"/>
+            </a:xfrm>
+            <a:prstGeom prst="rect">
+              <a:avLst/>
+            </a:prstGeom>
+            <a:noFill/>
+          </p:spPr>
+          <p:txBody>
+            <a:bodyPr wrap="square" rtlCol="0">
+              <a:spAutoFit/>
+            </a:bodyPr>
+            <a:lstStyle/>
+            <a:p>
+              <a:r>
+                <a:rPr lang="en-US" dirty="0" smtClean="0"/>
+                <a:t>4</a:t>
+              </a:r>
+              <a:endParaRPr lang="en-US" dirty="0"/>
+            </a:p>
+          </p:txBody>
+        </p:sp>
+        <p:sp>
+          <p:nvSpPr>
+            <p:cNvPr id="21" name="TextBox 20"/>
+            <p:cNvSpPr txBox="1"/>
+            <p:nvPr/>
+          </p:nvSpPr>
+          <p:spPr>
+            <a:xfrm>
+              <a:off x="2786878" y="767577"/>
+              <a:ext cx="381876" cy="369332"/>
+            </a:xfrm>
+            <a:prstGeom prst="rect">
+              <a:avLst/>
+            </a:prstGeom>
+            <a:noFill/>
+          </p:spPr>
+          <p:txBody>
+            <a:bodyPr wrap="square" rtlCol="0">
+              <a:spAutoFit/>
+            </a:bodyPr>
+            <a:lstStyle/>
+            <a:p>
+              <a:r>
+                <a:rPr lang="en-US" dirty="0"/>
+                <a:t>5</a:t>
+              </a:r>
+            </a:p>
+          </p:txBody>
+        </p:sp>
+        <p:sp>
+          <p:nvSpPr>
+            <p:cNvPr id="22" name="TextBox 21"/>
+            <p:cNvSpPr txBox="1"/>
+            <p:nvPr/>
+          </p:nvSpPr>
+          <p:spPr>
+            <a:xfrm>
+              <a:off x="3252053" y="776703"/>
+              <a:ext cx="381876" cy="369332"/>
+            </a:xfrm>
+            <a:prstGeom prst="rect">
+              <a:avLst/>
+            </a:prstGeom>
+            <a:noFill/>
+          </p:spPr>
+          <p:txBody>
+            <a:bodyPr wrap="square" rtlCol="0">
+              <a:spAutoFit/>
+            </a:bodyPr>
+            <a:lstStyle/>
+            <a:p>
+              <a:r>
+                <a:rPr lang="en-US" dirty="0" smtClean="0"/>
+                <a:t>6</a:t>
+              </a:r>
+              <a:endParaRPr lang="en-US" dirty="0"/>
+            </a:p>
+          </p:txBody>
+        </p:sp>
+        <p:sp>
+          <p:nvSpPr>
+            <p:cNvPr id="23" name="TextBox 22"/>
+            <p:cNvSpPr txBox="1"/>
+            <p:nvPr/>
+          </p:nvSpPr>
+          <p:spPr>
+            <a:xfrm>
+              <a:off x="3712350" y="776251"/>
+              <a:ext cx="381876" cy="369332"/>
+            </a:xfrm>
+            <a:prstGeom prst="rect">
+              <a:avLst/>
+            </a:prstGeom>
+            <a:noFill/>
+          </p:spPr>
+          <p:txBody>
+            <a:bodyPr wrap="square" rtlCol="0">
+              <a:spAutoFit/>
+            </a:bodyPr>
+            <a:lstStyle/>
+            <a:p>
+              <a:r>
+                <a:rPr lang="en-US" dirty="0"/>
+                <a:t>7</a:t>
+              </a:r>
+            </a:p>
+          </p:txBody>
+        </p:sp>
+        <p:sp>
+          <p:nvSpPr>
+            <p:cNvPr id="24" name="TextBox 23"/>
+            <p:cNvSpPr txBox="1"/>
+            <p:nvPr/>
+          </p:nvSpPr>
+          <p:spPr>
+            <a:xfrm>
+              <a:off x="4208504" y="778243"/>
+              <a:ext cx="381876" cy="369332"/>
+            </a:xfrm>
+            <a:prstGeom prst="rect">
+              <a:avLst/>
+            </a:prstGeom>
+            <a:noFill/>
+          </p:spPr>
+          <p:txBody>
+            <a:bodyPr wrap="square" rtlCol="0">
+              <a:spAutoFit/>
+            </a:bodyPr>
+            <a:lstStyle/>
+            <a:p>
+              <a:r>
+                <a:rPr lang="en-US" dirty="0" smtClean="0"/>
+                <a:t>8</a:t>
+              </a:r>
+              <a:endParaRPr lang="en-US" dirty="0"/>
+            </a:p>
+          </p:txBody>
+        </p:sp>
+      </p:grpSp>
+      <p:grpSp>
+        <p:nvGrpSpPr>
+          <p:cNvPr id="25" name="Group 24"/>
+          <p:cNvGrpSpPr/>
+          <p:nvPr/>
+        </p:nvGrpSpPr>
+        <p:grpSpPr>
+          <a:xfrm>
+            <a:off x="465728" y="1189569"/>
+            <a:ext cx="316953" cy="2913806"/>
+            <a:chOff x="465728" y="1189569"/>
+            <a:chExt cx="316953" cy="2913806"/>
+          </a:xfrm>
+        </p:grpSpPr>
+        <p:sp>
+          <p:nvSpPr>
+            <p:cNvPr id="26" name="TextBox 25"/>
+            <p:cNvSpPr txBox="1"/>
+            <p:nvPr/>
+          </p:nvSpPr>
+          <p:spPr>
+            <a:xfrm>
+              <a:off x="468216" y="1189569"/>
+              <a:ext cx="301391" cy="369332"/>
+            </a:xfrm>
+            <a:prstGeom prst="rect">
+              <a:avLst/>
+            </a:prstGeom>
+            <a:noFill/>
+          </p:spPr>
+          <p:txBody>
+            <a:bodyPr wrap="square" rtlCol="0">
+              <a:spAutoFit/>
+            </a:bodyPr>
+            <a:lstStyle/>
+            <a:p>
+              <a:r>
+                <a:rPr lang="en-US" dirty="0" smtClean="0"/>
+                <a:t>1</a:t>
+              </a:r>
+              <a:endParaRPr lang="en-US" dirty="0"/>
+            </a:p>
+          </p:txBody>
+        </p:sp>
+        <p:grpSp>
+          <p:nvGrpSpPr>
+            <p:cNvPr id="27" name="Group 26"/>
+            <p:cNvGrpSpPr/>
+            <p:nvPr/>
+          </p:nvGrpSpPr>
+          <p:grpSpPr>
+            <a:xfrm>
+              <a:off x="465728" y="1549616"/>
+              <a:ext cx="316953" cy="2553759"/>
+              <a:chOff x="465728" y="1549616"/>
+              <a:chExt cx="316953" cy="2553759"/>
+            </a:xfrm>
+          </p:grpSpPr>
+          <p:sp>
+            <p:nvSpPr>
+              <p:cNvPr id="28" name="TextBox 27"/>
+              <p:cNvSpPr txBox="1"/>
+              <p:nvPr/>
+            </p:nvSpPr>
+            <p:spPr>
+              <a:xfrm>
+                <a:off x="470917" y="1549616"/>
+                <a:ext cx="301391" cy="369332"/>
+              </a:xfrm>
+              <a:prstGeom prst="rect">
+                <a:avLst/>
+              </a:prstGeom>
+              <a:noFill/>
+            </p:spPr>
+            <p:txBody>
+              <a:bodyPr wrap="square" rtlCol="0">
+                <a:spAutoFit/>
+              </a:bodyPr>
+              <a:lstStyle/>
+              <a:p>
+                <a:r>
+                  <a:rPr lang="en-US" dirty="0"/>
+                  <a:t>2</a:t>
+                </a:r>
+              </a:p>
+            </p:txBody>
+          </p:sp>
+          <p:sp>
+            <p:nvSpPr>
+              <p:cNvPr id="29" name="TextBox 28"/>
+              <p:cNvSpPr txBox="1"/>
+              <p:nvPr/>
+            </p:nvSpPr>
+            <p:spPr>
+              <a:xfrm>
+                <a:off x="473618" y="1890347"/>
+                <a:ext cx="301391" cy="369332"/>
+              </a:xfrm>
+              <a:prstGeom prst="rect">
+                <a:avLst/>
+              </a:prstGeom>
+              <a:noFill/>
+            </p:spPr>
+            <p:txBody>
+              <a:bodyPr wrap="square" rtlCol="0">
+                <a:spAutoFit/>
+              </a:bodyPr>
+              <a:lstStyle/>
+              <a:p>
+                <a:r>
+                  <a:rPr lang="en-US" dirty="0" smtClean="0"/>
+                  <a:t>3</a:t>
+                </a:r>
+                <a:endParaRPr lang="en-US" dirty="0"/>
+              </a:p>
+            </p:txBody>
+          </p:sp>
+          <p:sp>
+            <p:nvSpPr>
+              <p:cNvPr id="30" name="TextBox 29"/>
+              <p:cNvSpPr txBox="1"/>
+              <p:nvPr/>
+            </p:nvSpPr>
+            <p:spPr>
+              <a:xfrm>
+                <a:off x="481148" y="2289026"/>
+                <a:ext cx="301391" cy="369332"/>
+              </a:xfrm>
+              <a:prstGeom prst="rect">
+                <a:avLst/>
+              </a:prstGeom>
+              <a:noFill/>
+            </p:spPr>
+            <p:txBody>
+              <a:bodyPr wrap="square" rtlCol="0">
+                <a:spAutoFit/>
+              </a:bodyPr>
+              <a:lstStyle/>
+              <a:p>
+                <a:r>
+                  <a:rPr lang="en-US" dirty="0"/>
+                  <a:t>4</a:t>
+                </a:r>
+              </a:p>
+            </p:txBody>
+          </p:sp>
+          <p:sp>
+            <p:nvSpPr>
+              <p:cNvPr id="31" name="TextBox 30"/>
+              <p:cNvSpPr txBox="1"/>
+              <p:nvPr/>
+            </p:nvSpPr>
+            <p:spPr>
+              <a:xfrm>
+                <a:off x="473689" y="2649073"/>
+                <a:ext cx="301391" cy="369332"/>
+              </a:xfrm>
+              <a:prstGeom prst="rect">
+                <a:avLst/>
+              </a:prstGeom>
+              <a:noFill/>
+            </p:spPr>
+            <p:txBody>
+              <a:bodyPr wrap="square" rtlCol="0">
+                <a:spAutoFit/>
+              </a:bodyPr>
+              <a:lstStyle/>
+              <a:p>
+                <a:r>
+                  <a:rPr lang="en-US" dirty="0" smtClean="0"/>
+                  <a:t>5</a:t>
+                </a:r>
+                <a:endParaRPr lang="en-US" dirty="0"/>
+              </a:p>
+            </p:txBody>
+          </p:sp>
+          <p:sp>
+            <p:nvSpPr>
+              <p:cNvPr id="32" name="TextBox 31"/>
+              <p:cNvSpPr txBox="1"/>
+              <p:nvPr/>
+            </p:nvSpPr>
+            <p:spPr>
+              <a:xfrm>
+                <a:off x="465728" y="3013949"/>
+                <a:ext cx="301391" cy="369332"/>
+              </a:xfrm>
+              <a:prstGeom prst="rect">
+                <a:avLst/>
+              </a:prstGeom>
+              <a:noFill/>
+            </p:spPr>
+            <p:txBody>
+              <a:bodyPr wrap="square" rtlCol="0">
+                <a:spAutoFit/>
+              </a:bodyPr>
+              <a:lstStyle/>
+              <a:p>
+                <a:r>
+                  <a:rPr lang="en-US" dirty="0"/>
+                  <a:t>6</a:t>
+                </a:r>
+              </a:p>
+            </p:txBody>
+          </p:sp>
+          <p:sp>
+            <p:nvSpPr>
+              <p:cNvPr id="33" name="TextBox 32"/>
+              <p:cNvSpPr txBox="1"/>
+              <p:nvPr/>
+            </p:nvSpPr>
+            <p:spPr>
+              <a:xfrm>
+                <a:off x="473760" y="3393312"/>
+                <a:ext cx="301391" cy="369332"/>
+              </a:xfrm>
+              <a:prstGeom prst="rect">
+                <a:avLst/>
+              </a:prstGeom>
+              <a:noFill/>
+            </p:spPr>
+            <p:txBody>
+              <a:bodyPr wrap="square" rtlCol="0">
+                <a:spAutoFit/>
+              </a:bodyPr>
+              <a:lstStyle/>
+              <a:p>
+                <a:r>
+                  <a:rPr lang="en-US" dirty="0" smtClean="0"/>
+                  <a:t>7</a:t>
+                </a:r>
+                <a:endParaRPr lang="en-US" dirty="0"/>
+              </a:p>
+            </p:txBody>
+          </p:sp>
+          <p:sp>
+            <p:nvSpPr>
+              <p:cNvPr id="34" name="TextBox 33"/>
+              <p:cNvSpPr txBox="1"/>
+              <p:nvPr/>
+            </p:nvSpPr>
+            <p:spPr>
+              <a:xfrm>
+                <a:off x="481290" y="3734043"/>
+                <a:ext cx="301391" cy="369332"/>
+              </a:xfrm>
+              <a:prstGeom prst="rect">
+                <a:avLst/>
+              </a:prstGeom>
+              <a:noFill/>
+            </p:spPr>
+            <p:txBody>
+              <a:bodyPr wrap="square" rtlCol="0">
+                <a:spAutoFit/>
+              </a:bodyPr>
+              <a:lstStyle/>
+              <a:p>
+                <a:r>
+                  <a:rPr lang="en-US" dirty="0"/>
+                  <a:t>8</a:t>
+                </a:r>
+              </a:p>
+            </p:txBody>
+          </p:sp>
+        </p:grpSp>
+      </p:grpSp>
+      <p:grpSp>
+        <p:nvGrpSpPr>
+          <p:cNvPr id="35" name="Group 34"/>
+          <p:cNvGrpSpPr/>
+          <p:nvPr/>
+        </p:nvGrpSpPr>
+        <p:grpSpPr>
+          <a:xfrm>
+            <a:off x="349066" y="184666"/>
+            <a:ext cx="1006807" cy="1036931"/>
+            <a:chOff x="349066" y="184666"/>
+            <a:chExt cx="1006807" cy="1036931"/>
+          </a:xfrm>
+        </p:grpSpPr>
+        <p:cxnSp>
+          <p:nvCxnSpPr>
+            <p:cNvPr id="36" name="Straight Arrow Connector 35"/>
+            <p:cNvCxnSpPr/>
+            <p:nvPr/>
+          </p:nvCxnSpPr>
+          <p:spPr>
+            <a:xfrm>
+              <a:off x="782539" y="581141"/>
+              <a:ext cx="474749" cy="0"/>
+            </a:xfrm>
+            <a:prstGeom prst="straightConnector1">
+              <a:avLst/>
+            </a:prstGeom>
+            <a:ln>
+              <a:solidFill>
+                <a:schemeClr val="tx1"/>
+              </a:solidFill>
+              <a:tailEnd type="arrow"/>
+            </a:ln>
+          </p:spPr>
+          <p:style>
+            <a:lnRef idx="2">
+              <a:schemeClr val="accent1"/>
+            </a:lnRef>
+            <a:fillRef idx="0">
+              <a:schemeClr val="accent1"/>
+            </a:fillRef>
+            <a:effectRef idx="1">
+              <a:schemeClr val="accent1"/>
+            </a:effectRef>
+            <a:fontRef idx="minor">
+              <a:schemeClr val="tx1"/>
+            </a:fontRef>
+          </p:style>
+        </p:cxnSp>
+        <p:cxnSp>
+          <p:nvCxnSpPr>
+            <p:cNvPr id="37" name="Straight Arrow Connector 36"/>
+            <p:cNvCxnSpPr/>
+            <p:nvPr/>
+          </p:nvCxnSpPr>
+          <p:spPr>
+            <a:xfrm>
+              <a:off x="349066" y="778243"/>
+              <a:ext cx="0" cy="443354"/>
+            </a:xfrm>
+            <a:prstGeom prst="straightConnector1">
+              <a:avLst/>
+            </a:prstGeom>
+            <a:ln>
+              <a:solidFill>
+                <a:schemeClr val="tx1"/>
+              </a:solidFill>
+              <a:tailEnd type="arrow"/>
+            </a:ln>
+          </p:spPr>
+          <p:style>
+            <a:lnRef idx="2">
+              <a:schemeClr val="accent1"/>
+            </a:lnRef>
+            <a:fillRef idx="0">
+              <a:schemeClr val="accent1"/>
+            </a:fillRef>
+            <a:effectRef idx="1">
+              <a:schemeClr val="accent1"/>
+            </a:effectRef>
+            <a:fontRef idx="minor">
+              <a:schemeClr val="tx1"/>
+            </a:fontRef>
+          </p:style>
+        </p:cxnSp>
+        <p:sp>
+          <p:nvSpPr>
+            <p:cNvPr id="38" name="TextBox 37"/>
+            <p:cNvSpPr txBox="1"/>
+            <p:nvPr/>
+          </p:nvSpPr>
+          <p:spPr>
+            <a:xfrm>
+              <a:off x="865704" y="184666"/>
+              <a:ext cx="490169" cy="369332"/>
+            </a:xfrm>
+            <a:prstGeom prst="rect">
+              <a:avLst/>
+            </a:prstGeom>
+            <a:noFill/>
+          </p:spPr>
+          <p:txBody>
+            <a:bodyPr wrap="square" rtlCol="0">
+              <a:spAutoFit/>
+            </a:bodyPr>
+            <a:lstStyle/>
+            <a:p>
+              <a:r>
+                <a:rPr lang="en-US" dirty="0" err="1" smtClean="0"/>
+                <a:t>i</a:t>
+              </a:r>
+              <a:endParaRPr lang="en-US" dirty="0"/>
+            </a:p>
+          </p:txBody>
+        </p:sp>
+        <p:sp>
+          <p:nvSpPr>
+            <p:cNvPr id="39" name="TextBox 38"/>
+            <p:cNvSpPr txBox="1"/>
+            <p:nvPr/>
+          </p:nvSpPr>
+          <p:spPr>
+            <a:xfrm>
+              <a:off x="393792" y="724498"/>
+              <a:ext cx="490169" cy="369332"/>
+            </a:xfrm>
+            <a:prstGeom prst="rect">
+              <a:avLst/>
+            </a:prstGeom>
+            <a:noFill/>
+          </p:spPr>
+          <p:txBody>
+            <a:bodyPr wrap="square" rtlCol="0">
+              <a:spAutoFit/>
+            </a:bodyPr>
+            <a:lstStyle/>
+            <a:p>
+              <a:r>
+                <a:rPr lang="en-US" dirty="0"/>
+                <a:t>j</a:t>
+              </a:r>
+            </a:p>
+          </p:txBody>
+        </p:sp>
+      </p:grpSp>
+      <p:grpSp>
+        <p:nvGrpSpPr>
+          <p:cNvPr id="40" name="Group 39"/>
+          <p:cNvGrpSpPr/>
+          <p:nvPr/>
+        </p:nvGrpSpPr>
+        <p:grpSpPr>
+          <a:xfrm>
+            <a:off x="4687189" y="1838144"/>
             <a:ext cx="988507" cy="1969435"/>
             <a:chOff x="4872761" y="2575364"/>
             <a:chExt cx="988507" cy="1969435"/>
@@ -10118,7 +11451,7 @@
         </p:grpSpPr>
         <p:sp>
           <p:nvSpPr>
-            <p:cNvPr id="5" name="TextBox 4"/>
+            <p:cNvPr id="41" name="TextBox 40"/>
             <p:cNvSpPr txBox="1"/>
             <p:nvPr/>
           </p:nvSpPr>
@@ -10148,7 +11481,7 @@
         </p:sp>
         <p:sp>
           <p:nvSpPr>
-            <p:cNvPr id="6" name="TextBox 5"/>
+            <p:cNvPr id="42" name="TextBox 41"/>
             <p:cNvSpPr txBox="1"/>
             <p:nvPr/>
           </p:nvSpPr>
@@ -10178,7 +11511,7 @@
         </p:sp>
         <p:sp>
           <p:nvSpPr>
-            <p:cNvPr id="7" name="TextBox 6"/>
+            <p:cNvPr id="43" name="TextBox 42"/>
             <p:cNvSpPr txBox="1"/>
             <p:nvPr/>
           </p:nvSpPr>
@@ -10208,7 +11541,7 @@
         </p:sp>
         <p:sp>
           <p:nvSpPr>
-            <p:cNvPr id="8" name="TextBox 7"/>
+            <p:cNvPr id="44" name="TextBox 43"/>
             <p:cNvSpPr txBox="1"/>
             <p:nvPr/>
           </p:nvSpPr>
@@ -10239,20 +11572,20 @@
       </p:grpSp>
       <p:graphicFrame>
         <p:nvGraphicFramePr>
-          <p:cNvPr id="11" name="Table 10"/>
+          <p:cNvPr id="45" name="Table 44"/>
           <p:cNvGraphicFramePr>
             <a:graphicFrameLocks noGrp="1"/>
           </p:cNvGraphicFramePr>
           <p:nvPr>
             <p:extLst>
               <p:ext uri="{D42A27DB-BD31-4B8C-83A1-F6EECF244321}">
-                <p14:modId xmlns:p14="http://schemas.microsoft.com/office/powerpoint/2010/main" val="2225502287"/>
+                <p14:modId xmlns:p14="http://schemas.microsoft.com/office/powerpoint/2010/main" val="1106630028"/>
               </p:ext>
             </p:extLst>
           </p:nvPr>
         </p:nvGraphicFramePr>
         <p:xfrm>
-          <a:off x="6132632" y="1838940"/>
+          <a:off x="5630936" y="1838940"/>
           <a:ext cx="362441" cy="365760"/>
         </p:xfrm>
         <a:graphic>
@@ -10322,20 +11655,20 @@
       </p:graphicFrame>
       <p:graphicFrame>
         <p:nvGraphicFramePr>
-          <p:cNvPr id="12" name="Table 11"/>
+          <p:cNvPr id="46" name="Table 45"/>
           <p:cNvGraphicFramePr>
             <a:graphicFrameLocks noGrp="1"/>
           </p:cNvGraphicFramePr>
           <p:nvPr>
             <p:extLst>
               <p:ext uri="{D42A27DB-BD31-4B8C-83A1-F6EECF244321}">
-                <p14:modId xmlns:p14="http://schemas.microsoft.com/office/powerpoint/2010/main" val="197931742"/>
+                <p14:modId xmlns:p14="http://schemas.microsoft.com/office/powerpoint/2010/main" val="130188723"/>
               </p:ext>
             </p:extLst>
           </p:nvPr>
         </p:nvGraphicFramePr>
         <p:xfrm>
-          <a:off x="6138827" y="2378655"/>
+          <a:off x="5637131" y="2378655"/>
           <a:ext cx="362441" cy="365760"/>
         </p:xfrm>
         <a:graphic>
@@ -10405,20 +11738,20 @@
       </p:graphicFrame>
       <p:graphicFrame>
         <p:nvGraphicFramePr>
-          <p:cNvPr id="13" name="Table 12"/>
+          <p:cNvPr id="47" name="Table 46"/>
           <p:cNvGraphicFramePr>
             <a:graphicFrameLocks noGrp="1"/>
           </p:cNvGraphicFramePr>
           <p:nvPr>
             <p:extLst>
               <p:ext uri="{D42A27DB-BD31-4B8C-83A1-F6EECF244321}">
-                <p14:modId xmlns:p14="http://schemas.microsoft.com/office/powerpoint/2010/main" val="34884254"/>
+                <p14:modId xmlns:p14="http://schemas.microsoft.com/office/powerpoint/2010/main" val="1443455302"/>
               </p:ext>
             </p:extLst>
           </p:nvPr>
         </p:nvGraphicFramePr>
         <p:xfrm>
-          <a:off x="6132632" y="2937777"/>
+          <a:off x="5630936" y="2937777"/>
           <a:ext cx="362441" cy="365760"/>
         </p:xfrm>
         <a:graphic>
@@ -10488,20 +11821,20 @@
       </p:graphicFrame>
       <p:graphicFrame>
         <p:nvGraphicFramePr>
-          <p:cNvPr id="14" name="Table 13"/>
+          <p:cNvPr id="48" name="Table 47"/>
           <p:cNvGraphicFramePr>
             <a:graphicFrameLocks noGrp="1"/>
           </p:cNvGraphicFramePr>
           <p:nvPr>
             <p:extLst>
               <p:ext uri="{D42A27DB-BD31-4B8C-83A1-F6EECF244321}">
-                <p14:modId xmlns:p14="http://schemas.microsoft.com/office/powerpoint/2010/main" val="1670501656"/>
+                <p14:modId xmlns:p14="http://schemas.microsoft.com/office/powerpoint/2010/main" val="3169481040"/>
               </p:ext>
             </p:extLst>
           </p:nvPr>
         </p:nvGraphicFramePr>
         <p:xfrm>
-          <a:off x="6131075" y="3463110"/>
+          <a:off x="5629379" y="3463110"/>
           <a:ext cx="362441" cy="365760"/>
         </p:xfrm>
         <a:graphic>
@@ -10579,6 +11912,13 @@
   <p:clrMapOvr>
     <a:masterClrMapping/>
   </p:clrMapOvr>
+  <p:timing>
+    <p:tnLst>
+      <p:par>
+        <p:cTn xmlns:p14="http://schemas.microsoft.com/office/powerpoint/2010/main" id="1" dur="indefinite" restart="never" nodeType="tmRoot"/>
+      </p:par>
+    </p:tnLst>
+  </p:timing>
 </p:sld>
 </file>
 
@@ -13855,13 +15195,676 @@
       </p:graphicFrame>
       <p:grpSp>
         <p:nvGrpSpPr>
-          <p:cNvPr id="16" name="Group 15"/>
+          <p:cNvPr id="15" name="Group 14"/>
           <p:cNvGrpSpPr/>
           <p:nvPr/>
         </p:nvGrpSpPr>
         <p:grpSpPr>
           <a:xfrm>
-            <a:off x="5188885" y="1838144"/>
+            <a:off x="909413" y="767577"/>
+            <a:ext cx="3680967" cy="379998"/>
+            <a:chOff x="909413" y="767577"/>
+            <a:chExt cx="3680967" cy="379998"/>
+          </a:xfrm>
+        </p:grpSpPr>
+        <p:sp>
+          <p:nvSpPr>
+            <p:cNvPr id="17" name="TextBox 16"/>
+            <p:cNvSpPr txBox="1"/>
+            <p:nvPr/>
+          </p:nvSpPr>
+          <p:spPr>
+            <a:xfrm>
+              <a:off x="909413" y="768735"/>
+              <a:ext cx="381876" cy="369332"/>
+            </a:xfrm>
+            <a:prstGeom prst="rect">
+              <a:avLst/>
+            </a:prstGeom>
+            <a:noFill/>
+          </p:spPr>
+          <p:txBody>
+            <a:bodyPr wrap="square" rtlCol="0">
+              <a:spAutoFit/>
+            </a:bodyPr>
+            <a:lstStyle/>
+            <a:p>
+              <a:r>
+                <a:rPr lang="en-US" dirty="0" smtClean="0"/>
+                <a:t>1</a:t>
+              </a:r>
+              <a:endParaRPr lang="en-US" dirty="0"/>
+            </a:p>
+          </p:txBody>
+        </p:sp>
+        <p:sp>
+          <p:nvSpPr>
+            <p:cNvPr id="18" name="TextBox 17"/>
+            <p:cNvSpPr txBox="1"/>
+            <p:nvPr/>
+          </p:nvSpPr>
+          <p:spPr>
+            <a:xfrm>
+              <a:off x="1379284" y="770727"/>
+              <a:ext cx="381876" cy="369332"/>
+            </a:xfrm>
+            <a:prstGeom prst="rect">
+              <a:avLst/>
+            </a:prstGeom>
+            <a:noFill/>
+          </p:spPr>
+          <p:txBody>
+            <a:bodyPr wrap="square" rtlCol="0">
+              <a:spAutoFit/>
+            </a:bodyPr>
+            <a:lstStyle/>
+            <a:p>
+              <a:r>
+                <a:rPr lang="en-US" dirty="0"/>
+                <a:t>2</a:t>
+              </a:r>
+            </a:p>
+          </p:txBody>
+        </p:sp>
+        <p:sp>
+          <p:nvSpPr>
+            <p:cNvPr id="19" name="TextBox 18"/>
+            <p:cNvSpPr txBox="1"/>
+            <p:nvPr/>
+          </p:nvSpPr>
+          <p:spPr>
+            <a:xfrm>
+              <a:off x="1856710" y="770727"/>
+              <a:ext cx="381876" cy="369332"/>
+            </a:xfrm>
+            <a:prstGeom prst="rect">
+              <a:avLst/>
+            </a:prstGeom>
+            <a:noFill/>
+          </p:spPr>
+          <p:txBody>
+            <a:bodyPr wrap="square" rtlCol="0">
+              <a:spAutoFit/>
+            </a:bodyPr>
+            <a:lstStyle/>
+            <a:p>
+              <a:r>
+                <a:rPr lang="en-US" dirty="0"/>
+                <a:t>3</a:t>
+              </a:r>
+            </a:p>
+          </p:txBody>
+        </p:sp>
+        <p:sp>
+          <p:nvSpPr>
+            <p:cNvPr id="20" name="TextBox 19"/>
+            <p:cNvSpPr txBox="1"/>
+            <p:nvPr/>
+          </p:nvSpPr>
+          <p:spPr>
+            <a:xfrm>
+              <a:off x="2331459" y="772719"/>
+              <a:ext cx="381876" cy="369332"/>
+            </a:xfrm>
+            <a:prstGeom prst="rect">
+              <a:avLst/>
+            </a:prstGeom>
+            <a:noFill/>
+          </p:spPr>
+          <p:txBody>
+            <a:bodyPr wrap="square" rtlCol="0">
+              <a:spAutoFit/>
+            </a:bodyPr>
+            <a:lstStyle/>
+            <a:p>
+              <a:r>
+                <a:rPr lang="en-US" dirty="0" smtClean="0"/>
+                <a:t>4</a:t>
+              </a:r>
+              <a:endParaRPr lang="en-US" dirty="0"/>
+            </a:p>
+          </p:txBody>
+        </p:sp>
+        <p:sp>
+          <p:nvSpPr>
+            <p:cNvPr id="21" name="TextBox 20"/>
+            <p:cNvSpPr txBox="1"/>
+            <p:nvPr/>
+          </p:nvSpPr>
+          <p:spPr>
+            <a:xfrm>
+              <a:off x="2786878" y="767577"/>
+              <a:ext cx="381876" cy="369332"/>
+            </a:xfrm>
+            <a:prstGeom prst="rect">
+              <a:avLst/>
+            </a:prstGeom>
+            <a:noFill/>
+          </p:spPr>
+          <p:txBody>
+            <a:bodyPr wrap="square" rtlCol="0">
+              <a:spAutoFit/>
+            </a:bodyPr>
+            <a:lstStyle/>
+            <a:p>
+              <a:r>
+                <a:rPr lang="en-US" dirty="0"/>
+                <a:t>5</a:t>
+              </a:r>
+            </a:p>
+          </p:txBody>
+        </p:sp>
+        <p:sp>
+          <p:nvSpPr>
+            <p:cNvPr id="22" name="TextBox 21"/>
+            <p:cNvSpPr txBox="1"/>
+            <p:nvPr/>
+          </p:nvSpPr>
+          <p:spPr>
+            <a:xfrm>
+              <a:off x="3252053" y="776703"/>
+              <a:ext cx="381876" cy="369332"/>
+            </a:xfrm>
+            <a:prstGeom prst="rect">
+              <a:avLst/>
+            </a:prstGeom>
+            <a:noFill/>
+          </p:spPr>
+          <p:txBody>
+            <a:bodyPr wrap="square" rtlCol="0">
+              <a:spAutoFit/>
+            </a:bodyPr>
+            <a:lstStyle/>
+            <a:p>
+              <a:r>
+                <a:rPr lang="en-US" dirty="0" smtClean="0"/>
+                <a:t>6</a:t>
+              </a:r>
+              <a:endParaRPr lang="en-US" dirty="0"/>
+            </a:p>
+          </p:txBody>
+        </p:sp>
+        <p:sp>
+          <p:nvSpPr>
+            <p:cNvPr id="23" name="TextBox 22"/>
+            <p:cNvSpPr txBox="1"/>
+            <p:nvPr/>
+          </p:nvSpPr>
+          <p:spPr>
+            <a:xfrm>
+              <a:off x="3712350" y="776251"/>
+              <a:ext cx="381876" cy="369332"/>
+            </a:xfrm>
+            <a:prstGeom prst="rect">
+              <a:avLst/>
+            </a:prstGeom>
+            <a:noFill/>
+          </p:spPr>
+          <p:txBody>
+            <a:bodyPr wrap="square" rtlCol="0">
+              <a:spAutoFit/>
+            </a:bodyPr>
+            <a:lstStyle/>
+            <a:p>
+              <a:r>
+                <a:rPr lang="en-US" dirty="0"/>
+                <a:t>7</a:t>
+              </a:r>
+            </a:p>
+          </p:txBody>
+        </p:sp>
+        <p:sp>
+          <p:nvSpPr>
+            <p:cNvPr id="24" name="TextBox 23"/>
+            <p:cNvSpPr txBox="1"/>
+            <p:nvPr/>
+          </p:nvSpPr>
+          <p:spPr>
+            <a:xfrm>
+              <a:off x="4208504" y="778243"/>
+              <a:ext cx="381876" cy="369332"/>
+            </a:xfrm>
+            <a:prstGeom prst="rect">
+              <a:avLst/>
+            </a:prstGeom>
+            <a:noFill/>
+          </p:spPr>
+          <p:txBody>
+            <a:bodyPr wrap="square" rtlCol="0">
+              <a:spAutoFit/>
+            </a:bodyPr>
+            <a:lstStyle/>
+            <a:p>
+              <a:r>
+                <a:rPr lang="en-US" dirty="0" smtClean="0"/>
+                <a:t>8</a:t>
+              </a:r>
+              <a:endParaRPr lang="en-US" dirty="0"/>
+            </a:p>
+          </p:txBody>
+        </p:sp>
+      </p:grpSp>
+      <p:grpSp>
+        <p:nvGrpSpPr>
+          <p:cNvPr id="25" name="Group 24"/>
+          <p:cNvGrpSpPr/>
+          <p:nvPr/>
+        </p:nvGrpSpPr>
+        <p:grpSpPr>
+          <a:xfrm>
+            <a:off x="465728" y="1189569"/>
+            <a:ext cx="316953" cy="2913806"/>
+            <a:chOff x="465728" y="1189569"/>
+            <a:chExt cx="316953" cy="2913806"/>
+          </a:xfrm>
+        </p:grpSpPr>
+        <p:sp>
+          <p:nvSpPr>
+            <p:cNvPr id="26" name="TextBox 25"/>
+            <p:cNvSpPr txBox="1"/>
+            <p:nvPr/>
+          </p:nvSpPr>
+          <p:spPr>
+            <a:xfrm>
+              <a:off x="468216" y="1189569"/>
+              <a:ext cx="301391" cy="369332"/>
+            </a:xfrm>
+            <a:prstGeom prst="rect">
+              <a:avLst/>
+            </a:prstGeom>
+            <a:noFill/>
+          </p:spPr>
+          <p:txBody>
+            <a:bodyPr wrap="square" rtlCol="0">
+              <a:spAutoFit/>
+            </a:bodyPr>
+            <a:lstStyle/>
+            <a:p>
+              <a:r>
+                <a:rPr lang="en-US" dirty="0" smtClean="0"/>
+                <a:t>1</a:t>
+              </a:r>
+              <a:endParaRPr lang="en-US" dirty="0"/>
+            </a:p>
+          </p:txBody>
+        </p:sp>
+        <p:grpSp>
+          <p:nvGrpSpPr>
+            <p:cNvPr id="27" name="Group 26"/>
+            <p:cNvGrpSpPr/>
+            <p:nvPr/>
+          </p:nvGrpSpPr>
+          <p:grpSpPr>
+            <a:xfrm>
+              <a:off x="465728" y="1549616"/>
+              <a:ext cx="316953" cy="2553759"/>
+              <a:chOff x="465728" y="1549616"/>
+              <a:chExt cx="316953" cy="2553759"/>
+            </a:xfrm>
+          </p:grpSpPr>
+          <p:sp>
+            <p:nvSpPr>
+              <p:cNvPr id="28" name="TextBox 27"/>
+              <p:cNvSpPr txBox="1"/>
+              <p:nvPr/>
+            </p:nvSpPr>
+            <p:spPr>
+              <a:xfrm>
+                <a:off x="470917" y="1549616"/>
+                <a:ext cx="301391" cy="369332"/>
+              </a:xfrm>
+              <a:prstGeom prst="rect">
+                <a:avLst/>
+              </a:prstGeom>
+              <a:noFill/>
+            </p:spPr>
+            <p:txBody>
+              <a:bodyPr wrap="square" rtlCol="0">
+                <a:spAutoFit/>
+              </a:bodyPr>
+              <a:lstStyle/>
+              <a:p>
+                <a:r>
+                  <a:rPr lang="en-US" dirty="0"/>
+                  <a:t>2</a:t>
+                </a:r>
+              </a:p>
+            </p:txBody>
+          </p:sp>
+          <p:sp>
+            <p:nvSpPr>
+              <p:cNvPr id="29" name="TextBox 28"/>
+              <p:cNvSpPr txBox="1"/>
+              <p:nvPr/>
+            </p:nvSpPr>
+            <p:spPr>
+              <a:xfrm>
+                <a:off x="473618" y="1890347"/>
+                <a:ext cx="301391" cy="369332"/>
+              </a:xfrm>
+              <a:prstGeom prst="rect">
+                <a:avLst/>
+              </a:prstGeom>
+              <a:noFill/>
+            </p:spPr>
+            <p:txBody>
+              <a:bodyPr wrap="square" rtlCol="0">
+                <a:spAutoFit/>
+              </a:bodyPr>
+              <a:lstStyle/>
+              <a:p>
+                <a:r>
+                  <a:rPr lang="en-US" dirty="0" smtClean="0"/>
+                  <a:t>3</a:t>
+                </a:r>
+                <a:endParaRPr lang="en-US" dirty="0"/>
+              </a:p>
+            </p:txBody>
+          </p:sp>
+          <p:sp>
+            <p:nvSpPr>
+              <p:cNvPr id="30" name="TextBox 29"/>
+              <p:cNvSpPr txBox="1"/>
+              <p:nvPr/>
+            </p:nvSpPr>
+            <p:spPr>
+              <a:xfrm>
+                <a:off x="481148" y="2289026"/>
+                <a:ext cx="301391" cy="369332"/>
+              </a:xfrm>
+              <a:prstGeom prst="rect">
+                <a:avLst/>
+              </a:prstGeom>
+              <a:noFill/>
+            </p:spPr>
+            <p:txBody>
+              <a:bodyPr wrap="square" rtlCol="0">
+                <a:spAutoFit/>
+              </a:bodyPr>
+              <a:lstStyle/>
+              <a:p>
+                <a:r>
+                  <a:rPr lang="en-US" dirty="0"/>
+                  <a:t>4</a:t>
+                </a:r>
+              </a:p>
+            </p:txBody>
+          </p:sp>
+          <p:sp>
+            <p:nvSpPr>
+              <p:cNvPr id="31" name="TextBox 30"/>
+              <p:cNvSpPr txBox="1"/>
+              <p:nvPr/>
+            </p:nvSpPr>
+            <p:spPr>
+              <a:xfrm>
+                <a:off x="473689" y="2649073"/>
+                <a:ext cx="301391" cy="369332"/>
+              </a:xfrm>
+              <a:prstGeom prst="rect">
+                <a:avLst/>
+              </a:prstGeom>
+              <a:noFill/>
+            </p:spPr>
+            <p:txBody>
+              <a:bodyPr wrap="square" rtlCol="0">
+                <a:spAutoFit/>
+              </a:bodyPr>
+              <a:lstStyle/>
+              <a:p>
+                <a:r>
+                  <a:rPr lang="en-US" dirty="0" smtClean="0"/>
+                  <a:t>5</a:t>
+                </a:r>
+                <a:endParaRPr lang="en-US" dirty="0"/>
+              </a:p>
+            </p:txBody>
+          </p:sp>
+          <p:sp>
+            <p:nvSpPr>
+              <p:cNvPr id="32" name="TextBox 31"/>
+              <p:cNvSpPr txBox="1"/>
+              <p:nvPr/>
+            </p:nvSpPr>
+            <p:spPr>
+              <a:xfrm>
+                <a:off x="465728" y="3013949"/>
+                <a:ext cx="301391" cy="369332"/>
+              </a:xfrm>
+              <a:prstGeom prst="rect">
+                <a:avLst/>
+              </a:prstGeom>
+              <a:noFill/>
+            </p:spPr>
+            <p:txBody>
+              <a:bodyPr wrap="square" rtlCol="0">
+                <a:spAutoFit/>
+              </a:bodyPr>
+              <a:lstStyle/>
+              <a:p>
+                <a:r>
+                  <a:rPr lang="en-US" dirty="0"/>
+                  <a:t>6</a:t>
+                </a:r>
+              </a:p>
+            </p:txBody>
+          </p:sp>
+          <p:sp>
+            <p:nvSpPr>
+              <p:cNvPr id="33" name="TextBox 32"/>
+              <p:cNvSpPr txBox="1"/>
+              <p:nvPr/>
+            </p:nvSpPr>
+            <p:spPr>
+              <a:xfrm>
+                <a:off x="473760" y="3393312"/>
+                <a:ext cx="301391" cy="369332"/>
+              </a:xfrm>
+              <a:prstGeom prst="rect">
+                <a:avLst/>
+              </a:prstGeom>
+              <a:noFill/>
+            </p:spPr>
+            <p:txBody>
+              <a:bodyPr wrap="square" rtlCol="0">
+                <a:spAutoFit/>
+              </a:bodyPr>
+              <a:lstStyle/>
+              <a:p>
+                <a:r>
+                  <a:rPr lang="en-US" dirty="0" smtClean="0"/>
+                  <a:t>7</a:t>
+                </a:r>
+                <a:endParaRPr lang="en-US" dirty="0"/>
+              </a:p>
+            </p:txBody>
+          </p:sp>
+          <p:sp>
+            <p:nvSpPr>
+              <p:cNvPr id="34" name="TextBox 33"/>
+              <p:cNvSpPr txBox="1"/>
+              <p:nvPr/>
+            </p:nvSpPr>
+            <p:spPr>
+              <a:xfrm>
+                <a:off x="481290" y="3734043"/>
+                <a:ext cx="301391" cy="369332"/>
+              </a:xfrm>
+              <a:prstGeom prst="rect">
+                <a:avLst/>
+              </a:prstGeom>
+              <a:noFill/>
+            </p:spPr>
+            <p:txBody>
+              <a:bodyPr wrap="square" rtlCol="0">
+                <a:spAutoFit/>
+              </a:bodyPr>
+              <a:lstStyle/>
+              <a:p>
+                <a:r>
+                  <a:rPr lang="en-US" dirty="0"/>
+                  <a:t>8</a:t>
+                </a:r>
+              </a:p>
+            </p:txBody>
+          </p:sp>
+        </p:grpSp>
+      </p:grpSp>
+      <p:grpSp>
+        <p:nvGrpSpPr>
+          <p:cNvPr id="35" name="Group 34"/>
+          <p:cNvGrpSpPr/>
+          <p:nvPr/>
+        </p:nvGrpSpPr>
+        <p:grpSpPr>
+          <a:xfrm>
+            <a:off x="349066" y="184666"/>
+            <a:ext cx="1006807" cy="1036931"/>
+            <a:chOff x="349066" y="184666"/>
+            <a:chExt cx="1006807" cy="1036931"/>
+          </a:xfrm>
+        </p:grpSpPr>
+        <p:cxnSp>
+          <p:nvCxnSpPr>
+            <p:cNvPr id="36" name="Straight Arrow Connector 35"/>
+            <p:cNvCxnSpPr/>
+            <p:nvPr/>
+          </p:nvCxnSpPr>
+          <p:spPr>
+            <a:xfrm>
+              <a:off x="782539" y="581141"/>
+              <a:ext cx="474749" cy="0"/>
+            </a:xfrm>
+            <a:prstGeom prst="straightConnector1">
+              <a:avLst/>
+            </a:prstGeom>
+            <a:ln>
+              <a:solidFill>
+                <a:schemeClr val="tx1"/>
+              </a:solidFill>
+              <a:tailEnd type="arrow"/>
+            </a:ln>
+          </p:spPr>
+          <p:style>
+            <a:lnRef idx="2">
+              <a:schemeClr val="accent1"/>
+            </a:lnRef>
+            <a:fillRef idx="0">
+              <a:schemeClr val="accent1"/>
+            </a:fillRef>
+            <a:effectRef idx="1">
+              <a:schemeClr val="accent1"/>
+            </a:effectRef>
+            <a:fontRef idx="minor">
+              <a:schemeClr val="tx1"/>
+            </a:fontRef>
+          </p:style>
+        </p:cxnSp>
+        <p:cxnSp>
+          <p:nvCxnSpPr>
+            <p:cNvPr id="37" name="Straight Arrow Connector 36"/>
+            <p:cNvCxnSpPr/>
+            <p:nvPr/>
+          </p:nvCxnSpPr>
+          <p:spPr>
+            <a:xfrm>
+              <a:off x="349066" y="778243"/>
+              <a:ext cx="0" cy="443354"/>
+            </a:xfrm>
+            <a:prstGeom prst="straightConnector1">
+              <a:avLst/>
+            </a:prstGeom>
+            <a:ln>
+              <a:solidFill>
+                <a:schemeClr val="tx1"/>
+              </a:solidFill>
+              <a:tailEnd type="arrow"/>
+            </a:ln>
+          </p:spPr>
+          <p:style>
+            <a:lnRef idx="2">
+              <a:schemeClr val="accent1"/>
+            </a:lnRef>
+            <a:fillRef idx="0">
+              <a:schemeClr val="accent1"/>
+            </a:fillRef>
+            <a:effectRef idx="1">
+              <a:schemeClr val="accent1"/>
+            </a:effectRef>
+            <a:fontRef idx="minor">
+              <a:schemeClr val="tx1"/>
+            </a:fontRef>
+          </p:style>
+        </p:cxnSp>
+        <p:sp>
+          <p:nvSpPr>
+            <p:cNvPr id="38" name="TextBox 37"/>
+            <p:cNvSpPr txBox="1"/>
+            <p:nvPr/>
+          </p:nvSpPr>
+          <p:spPr>
+            <a:xfrm>
+              <a:off x="865704" y="184666"/>
+              <a:ext cx="490169" cy="369332"/>
+            </a:xfrm>
+            <a:prstGeom prst="rect">
+              <a:avLst/>
+            </a:prstGeom>
+            <a:noFill/>
+          </p:spPr>
+          <p:txBody>
+            <a:bodyPr wrap="square" rtlCol="0">
+              <a:spAutoFit/>
+            </a:bodyPr>
+            <a:lstStyle/>
+            <a:p>
+              <a:r>
+                <a:rPr lang="en-US" dirty="0" err="1" smtClean="0"/>
+                <a:t>i</a:t>
+              </a:r>
+              <a:endParaRPr lang="en-US" dirty="0"/>
+            </a:p>
+          </p:txBody>
+        </p:sp>
+        <p:sp>
+          <p:nvSpPr>
+            <p:cNvPr id="39" name="TextBox 38"/>
+            <p:cNvSpPr txBox="1"/>
+            <p:nvPr/>
+          </p:nvSpPr>
+          <p:spPr>
+            <a:xfrm>
+              <a:off x="393792" y="724498"/>
+              <a:ext cx="490169" cy="369332"/>
+            </a:xfrm>
+            <a:prstGeom prst="rect">
+              <a:avLst/>
+            </a:prstGeom>
+            <a:noFill/>
+          </p:spPr>
+          <p:txBody>
+            <a:bodyPr wrap="square" rtlCol="0">
+              <a:spAutoFit/>
+            </a:bodyPr>
+            <a:lstStyle/>
+            <a:p>
+              <a:r>
+                <a:rPr lang="en-US" dirty="0"/>
+                <a:t>j</a:t>
+              </a:r>
+            </a:p>
+          </p:txBody>
+        </p:sp>
+      </p:grpSp>
+      <p:grpSp>
+        <p:nvGrpSpPr>
+          <p:cNvPr id="40" name="Group 39"/>
+          <p:cNvGrpSpPr/>
+          <p:nvPr/>
+        </p:nvGrpSpPr>
+        <p:grpSpPr>
+          <a:xfrm>
+            <a:off x="4687189" y="1838144"/>
             <a:ext cx="988507" cy="1969435"/>
             <a:chOff x="4872761" y="2575364"/>
             <a:chExt cx="988507" cy="1969435"/>
@@ -13869,7 +15872,7 @@
         </p:grpSpPr>
         <p:sp>
           <p:nvSpPr>
-            <p:cNvPr id="5" name="TextBox 4"/>
+            <p:cNvPr id="41" name="TextBox 40"/>
             <p:cNvSpPr txBox="1"/>
             <p:nvPr/>
           </p:nvSpPr>
@@ -13899,7 +15902,7 @@
         </p:sp>
         <p:sp>
           <p:nvSpPr>
-            <p:cNvPr id="6" name="TextBox 5"/>
+            <p:cNvPr id="42" name="TextBox 41"/>
             <p:cNvSpPr txBox="1"/>
             <p:nvPr/>
           </p:nvSpPr>
@@ -13929,7 +15932,7 @@
         </p:sp>
         <p:sp>
           <p:nvSpPr>
-            <p:cNvPr id="7" name="TextBox 6"/>
+            <p:cNvPr id="43" name="TextBox 42"/>
             <p:cNvSpPr txBox="1"/>
             <p:nvPr/>
           </p:nvSpPr>
@@ -13959,7 +15962,7 @@
         </p:sp>
         <p:sp>
           <p:nvSpPr>
-            <p:cNvPr id="8" name="TextBox 7"/>
+            <p:cNvPr id="44" name="TextBox 43"/>
             <p:cNvSpPr txBox="1"/>
             <p:nvPr/>
           </p:nvSpPr>
@@ -13990,20 +15993,20 @@
       </p:grpSp>
       <p:graphicFrame>
         <p:nvGraphicFramePr>
-          <p:cNvPr id="11" name="Table 10"/>
+          <p:cNvPr id="45" name="Table 44"/>
           <p:cNvGraphicFramePr>
             <a:graphicFrameLocks noGrp="1"/>
           </p:cNvGraphicFramePr>
           <p:nvPr>
             <p:extLst>
               <p:ext uri="{D42A27DB-BD31-4B8C-83A1-F6EECF244321}">
-                <p14:modId xmlns:p14="http://schemas.microsoft.com/office/powerpoint/2010/main" val="852558230"/>
+                <p14:modId xmlns:p14="http://schemas.microsoft.com/office/powerpoint/2010/main" val="1106630028"/>
               </p:ext>
             </p:extLst>
           </p:nvPr>
         </p:nvGraphicFramePr>
         <p:xfrm>
-          <a:off x="6132632" y="1838940"/>
+          <a:off x="5630936" y="1838940"/>
           <a:ext cx="362441" cy="365760"/>
         </p:xfrm>
         <a:graphic>
@@ -14073,20 +16076,20 @@
       </p:graphicFrame>
       <p:graphicFrame>
         <p:nvGraphicFramePr>
-          <p:cNvPr id="12" name="Table 11"/>
+          <p:cNvPr id="46" name="Table 45"/>
           <p:cNvGraphicFramePr>
             <a:graphicFrameLocks noGrp="1"/>
           </p:cNvGraphicFramePr>
           <p:nvPr>
             <p:extLst>
               <p:ext uri="{D42A27DB-BD31-4B8C-83A1-F6EECF244321}">
-                <p14:modId xmlns:p14="http://schemas.microsoft.com/office/powerpoint/2010/main" val="3453234814"/>
+                <p14:modId xmlns:p14="http://schemas.microsoft.com/office/powerpoint/2010/main" val="130188723"/>
               </p:ext>
             </p:extLst>
           </p:nvPr>
         </p:nvGraphicFramePr>
         <p:xfrm>
-          <a:off x="6138827" y="2378655"/>
+          <a:off x="5637131" y="2378655"/>
           <a:ext cx="362441" cy="365760"/>
         </p:xfrm>
         <a:graphic>
@@ -14156,20 +16159,20 @@
       </p:graphicFrame>
       <p:graphicFrame>
         <p:nvGraphicFramePr>
-          <p:cNvPr id="13" name="Table 12"/>
+          <p:cNvPr id="47" name="Table 46"/>
           <p:cNvGraphicFramePr>
             <a:graphicFrameLocks noGrp="1"/>
           </p:cNvGraphicFramePr>
           <p:nvPr>
             <p:extLst>
               <p:ext uri="{D42A27DB-BD31-4B8C-83A1-F6EECF244321}">
-                <p14:modId xmlns:p14="http://schemas.microsoft.com/office/powerpoint/2010/main" val="261764393"/>
+                <p14:modId xmlns:p14="http://schemas.microsoft.com/office/powerpoint/2010/main" val="1443455302"/>
               </p:ext>
             </p:extLst>
           </p:nvPr>
         </p:nvGraphicFramePr>
         <p:xfrm>
-          <a:off x="6132632" y="2937777"/>
+          <a:off x="5630936" y="2937777"/>
           <a:ext cx="362441" cy="365760"/>
         </p:xfrm>
         <a:graphic>
@@ -14239,20 +16242,20 @@
       </p:graphicFrame>
       <p:graphicFrame>
         <p:nvGraphicFramePr>
-          <p:cNvPr id="14" name="Table 13"/>
+          <p:cNvPr id="48" name="Table 47"/>
           <p:cNvGraphicFramePr>
             <a:graphicFrameLocks noGrp="1"/>
           </p:cNvGraphicFramePr>
           <p:nvPr>
             <p:extLst>
               <p:ext uri="{D42A27DB-BD31-4B8C-83A1-F6EECF244321}">
-                <p14:modId xmlns:p14="http://schemas.microsoft.com/office/powerpoint/2010/main" val="3693887953"/>
+                <p14:modId xmlns:p14="http://schemas.microsoft.com/office/powerpoint/2010/main" val="3169481040"/>
               </p:ext>
             </p:extLst>
           </p:nvPr>
         </p:nvGraphicFramePr>
         <p:xfrm>
-          <a:off x="6131075" y="3463110"/>
+          <a:off x="5629379" y="3463110"/>
           <a:ext cx="362441" cy="365760"/>
         </p:xfrm>
         <a:graphic>
@@ -14330,6 +16333,13 @@
   <p:clrMapOvr>
     <a:masterClrMapping/>
   </p:clrMapOvr>
+  <p:timing>
+    <p:tnLst>
+      <p:par>
+        <p:cTn xmlns:p14="http://schemas.microsoft.com/office/powerpoint/2010/main" id="1" dur="indefinite" restart="never" nodeType="tmRoot"/>
+      </p:par>
+    </p:tnLst>
+  </p:timing>
 </p:sld>
 </file>
 

</xml_diff>